<commit_message>
Sync 18-01-13 03:42:57 UTC+0 @SP3
</commit_message>
<xml_diff>
--- a/Slides/Rust Part Slides.pptx
+++ b/Slides/Rust Part Slides.pptx
@@ -19,6 +19,9 @@
     <p:sldId id="267" r:id="rId13"/>
     <p:sldId id="268" r:id="rId14"/>
     <p:sldId id="269" r:id="rId15"/>
+    <p:sldId id="270" r:id="rId16"/>
+    <p:sldId id="271" r:id="rId17"/>
+    <p:sldId id="272" r:id="rId18"/>
   </p:sldIdLst>
   <p:sldSz cx="9144000" cy="6858000" type="screen4x3"/>
   <p:notesSz cx="6858000" cy="9144000"/>
@@ -4526,7 +4529,7 @@
             </p:nvSpPr>
             <p:spPr>
               <a:xfrm>
-                <a:off x="628650" y="1825625"/>
+                <a:off x="914400" y="1825625"/>
                 <a:ext cx="2476500" cy="873125"/>
               </a:xfrm>
               <a:ln>
@@ -4665,7 +4668,7 @@
             </p:nvSpPr>
             <p:spPr>
               <a:xfrm>
-                <a:off x="628650" y="1825625"/>
+                <a:off x="914400" y="1825625"/>
                 <a:ext cx="2476500" cy="873125"/>
               </a:xfrm>
               <a:blipFill>
@@ -4713,7 +4716,7 @@
             </p:nvSpPr>
             <p:spPr>
               <a:xfrm>
-                <a:off x="3676650" y="1825625"/>
+                <a:off x="4038600" y="1825625"/>
                 <a:ext cx="5181600" cy="1273175"/>
               </a:xfrm>
             </p:spPr>
@@ -4730,7 +4733,7 @@
                   <a:rPr lang="en-US" sz="2000" dirty="0">
                     <a:latin typeface="Consolas" panose="020B0609020204030204" pitchFamily="49" charset="0"/>
                   </a:rPr>
-                  <a:t>   [$($t:ty),+ : $($e:expr),+]</a:t>
+                  <a:t> [$($t:ty),+ : $($e:expr),+]</a:t>
                 </a:r>
               </a:p>
               <a:p>
@@ -4913,13 +4916,13 @@
                       </m:dPr>
                       <m:e>
                         <m:r>
-                          <a:rPr lang="en-US" sz="2000" i="1">
+                          <a:rPr lang="en-US" sz="2000" b="0" i="1" smtClean="0">
                             <a:solidFill>
                               <a:srgbClr val="00B0F0"/>
                             </a:solidFill>
                             <a:latin typeface="Cambria Math" panose="02040503050406030204" pitchFamily="18" charset="0"/>
                           </a:rPr>
-                          <m:t>𝑡𝑦𝑝𝑒𝑛𝑎𝑚</m:t>
+                          <m:t>𝑒𝑥𝑝</m:t>
                         </m:r>
                         <m:sSup>
                           <m:sSupPr>
@@ -4933,15 +4936,6 @@
                             </m:ctrlPr>
                           </m:sSupPr>
                           <m:e>
-                            <m:r>
-                              <a:rPr lang="en-US" sz="2000" i="1">
-                                <a:solidFill>
-                                  <a:srgbClr val="00B0F0"/>
-                                </a:solidFill>
-                                <a:latin typeface="Cambria Math" panose="02040503050406030204" pitchFamily="18" charset="0"/>
-                              </a:rPr>
-                              <m:t>𝑒</m:t>
-                            </m:r>
                             <m:r>
                               <a:rPr lang="en-US" sz="2000" i="1">
                                 <a:solidFill>
@@ -5064,7 +5058,7 @@
             </p:nvSpPr>
             <p:spPr>
               <a:xfrm>
-                <a:off x="3676650" y="1825625"/>
+                <a:off x="4038600" y="1825625"/>
                 <a:ext cx="5181600" cy="1273175"/>
               </a:xfrm>
               <a:blipFill>
@@ -5545,7 +5539,7 @@
         </p:nvSpPr>
         <p:spPr>
           <a:xfrm>
-            <a:off x="488950" y="1657350"/>
+            <a:off x="774700" y="1657350"/>
             <a:ext cx="2533650" cy="1136650"/>
           </a:xfrm>
           <a:prstGeom prst="roundRect">
@@ -5602,8 +5596,8 @@
         </p:nvSpPr>
         <p:spPr>
           <a:xfrm>
-            <a:off x="3663950" y="1651000"/>
-            <a:ext cx="5016500" cy="1136650"/>
+            <a:off x="4006850" y="1651000"/>
+            <a:ext cx="4337050" cy="1136650"/>
           </a:xfrm>
           <a:prstGeom prst="roundRect">
             <a:avLst/>
@@ -5706,6 +5700,900 @@
     <p:extLst>
       <p:ext uri="{BB962C8B-B14F-4D97-AF65-F5344CB8AC3E}">
         <p14:creationId xmlns:p14="http://schemas.microsoft.com/office/powerpoint/2010/main" val="457821670"/>
+      </p:ext>
+    </p:extLst>
+  </p:cSld>
+  <p:clrMapOvr>
+    <a:masterClrMapping/>
+  </p:clrMapOvr>
+</p:sld>
+</file>
+
+<file path=ppt/slides/slide15.xml><?xml version="1.0" encoding="utf-8"?>
+<p:sld xmlns:a="http://schemas.openxmlformats.org/drawingml/2006/main" xmlns:r="http://schemas.openxmlformats.org/officeDocument/2006/relationships" xmlns:p="http://schemas.openxmlformats.org/presentationml/2006/main">
+  <p:cSld>
+    <p:spTree>
+      <p:nvGrpSpPr>
+        <p:cNvPr id="1" name=""/>
+        <p:cNvGrpSpPr/>
+        <p:nvPr/>
+      </p:nvGrpSpPr>
+      <p:grpSpPr>
+        <a:xfrm>
+          <a:off x="0" y="0"/>
+          <a:ext cx="0" cy="0"/>
+          <a:chOff x="0" y="0"/>
+          <a:chExt cx="0" cy="0"/>
+        </a:xfrm>
+      </p:grpSpPr>
+      <p:pic>
+        <p:nvPicPr>
+          <p:cNvPr id="5" name="内容占位符 4">
+            <a:extLst>
+              <a:ext uri="{FF2B5EF4-FFF2-40B4-BE49-F238E27FC236}">
+                <a16:creationId xmlns:a16="http://schemas.microsoft.com/office/drawing/2014/main" id="{AE712FF8-5E46-4AB5-8AA5-2224F274F05B}"/>
+              </a:ext>
+            </a:extLst>
+          </p:cNvPr>
+          <p:cNvPicPr>
+            <a:picLocks noChangeAspect="1"/>
+          </p:cNvPicPr>
+          <p:nvPr/>
+        </p:nvPicPr>
+        <p:blipFill>
+          <a:blip r:embed="rId2"/>
+          <a:stretch>
+            <a:fillRect/>
+          </a:stretch>
+        </p:blipFill>
+        <p:spPr>
+          <a:xfrm>
+            <a:off x="730369" y="653492"/>
+            <a:ext cx="7526188" cy="3789674"/>
+          </a:xfrm>
+          <a:prstGeom prst="rect">
+            <a:avLst/>
+          </a:prstGeom>
+        </p:spPr>
+      </p:pic>
+      <p:sp>
+        <p:nvSpPr>
+          <p:cNvPr id="8" name="矩形 7">
+            <a:extLst>
+              <a:ext uri="{FF2B5EF4-FFF2-40B4-BE49-F238E27FC236}">
+                <a16:creationId xmlns:a16="http://schemas.microsoft.com/office/drawing/2014/main" id="{19B703D0-0C3B-479F-9F54-136C875010D5}"/>
+              </a:ext>
+            </a:extLst>
+          </p:cNvPr>
+          <p:cNvSpPr/>
+          <p:nvPr/>
+        </p:nvSpPr>
+        <p:spPr>
+          <a:xfrm>
+            <a:off x="1797050" y="1416050"/>
+            <a:ext cx="3594100" cy="2025650"/>
+          </a:xfrm>
+          <a:prstGeom prst="rect">
+            <a:avLst/>
+          </a:prstGeom>
+          <a:solidFill>
+            <a:srgbClr val="FF6600">
+              <a:alpha val="18824"/>
+            </a:srgbClr>
+          </a:solidFill>
+          <a:ln w="19050" cap="flat" cmpd="sng" algn="ctr">
+            <a:solidFill>
+              <a:srgbClr val="FF0000"/>
+            </a:solidFill>
+            <a:prstDash val="solid"/>
+            <a:round/>
+            <a:headEnd type="none" w="med" len="med"/>
+            <a:tailEnd type="none" w="med" len="med"/>
+          </a:ln>
+        </p:spPr>
+        <p:style>
+          <a:lnRef idx="0">
+            <a:scrgbClr r="0" g="0" b="0"/>
+          </a:lnRef>
+          <a:fillRef idx="0">
+            <a:scrgbClr r="0" g="0" b="0"/>
+          </a:fillRef>
+          <a:effectRef idx="0">
+            <a:scrgbClr r="0" g="0" b="0"/>
+          </a:effectRef>
+          <a:fontRef idx="minor">
+            <a:schemeClr val="accent2"/>
+          </a:fontRef>
+        </p:style>
+        <p:txBody>
+          <a:bodyPr rot="0" spcFirstLastPara="0" vertOverflow="overflow" horzOverflow="overflow" vert="horz" wrap="square" lIns="91440" tIns="45720" rIns="91440" bIns="45720" numCol="1" spcCol="0" rtlCol="0" fromWordArt="0" anchor="ctr" anchorCtr="0" forceAA="0" compatLnSpc="1">
+            <a:prstTxWarp prst="textNoShape">
+              <a:avLst/>
+            </a:prstTxWarp>
+            <a:noAutofit/>
+          </a:bodyPr>
+          <a:lstStyle/>
+          <a:p>
+            <a:pPr algn="ctr"/>
+            <a:endParaRPr lang="en-US"/>
+          </a:p>
+        </p:txBody>
+      </p:sp>
+      <p:sp>
+        <p:nvSpPr>
+          <p:cNvPr id="2" name="矩形 1">
+            <a:extLst>
+              <a:ext uri="{FF2B5EF4-FFF2-40B4-BE49-F238E27FC236}">
+                <a16:creationId xmlns:a16="http://schemas.microsoft.com/office/drawing/2014/main" id="{685530C9-7695-4723-B223-58B3AD4D5894}"/>
+              </a:ext>
+            </a:extLst>
+          </p:cNvPr>
+          <p:cNvSpPr/>
+          <p:nvPr/>
+        </p:nvSpPr>
+        <p:spPr>
+          <a:xfrm>
+            <a:off x="2142992" y="5054084"/>
+            <a:ext cx="4764446" cy="646331"/>
+          </a:xfrm>
+          <a:prstGeom prst="rect">
+            <a:avLst/>
+          </a:prstGeom>
+        </p:spPr>
+        <p:txBody>
+          <a:bodyPr wrap="none">
+            <a:spAutoFit/>
+          </a:bodyPr>
+          <a:lstStyle/>
+          <a:p>
+            <a:r>
+              <a:rPr lang="zh-CN" altLang="en-US" dirty="0">
+                <a:latin typeface="Consolas" panose="020B0609020204030204" pitchFamily="49" charset="0"/>
+              </a:rPr>
+              <a:t>宏规则的右端使用的语法即</a:t>
+            </a:r>
+            <a:r>
+              <a:rPr lang="en-US" altLang="zh-CN" dirty="0">
+                <a:latin typeface="Consolas" panose="020B0609020204030204" pitchFamily="49" charset="0"/>
+              </a:rPr>
+              <a:t>Rust</a:t>
+            </a:r>
+            <a:r>
+              <a:rPr lang="zh-CN" altLang="en-US" dirty="0">
+                <a:latin typeface="Consolas" panose="020B0609020204030204" pitchFamily="49" charset="0"/>
+              </a:rPr>
+              <a:t>语法本身，</a:t>
+            </a:r>
+            <a:endParaRPr lang="en-US" altLang="zh-CN" dirty="0">
+              <a:latin typeface="Consolas" panose="020B0609020204030204" pitchFamily="49" charset="0"/>
+            </a:endParaRPr>
+          </a:p>
+          <a:p>
+            <a:r>
+              <a:rPr lang="zh-CN" altLang="en-US" dirty="0">
+                <a:latin typeface="Consolas" panose="020B0609020204030204" pitchFamily="49" charset="0"/>
+              </a:rPr>
+              <a:t>同时出现了和匹配器中类似的 </a:t>
+            </a:r>
+            <a:r>
+              <a:rPr lang="en-US" altLang="zh-CN" dirty="0">
+                <a:latin typeface="Consolas" panose="020B0609020204030204" pitchFamily="49" charset="0"/>
+              </a:rPr>
+              <a:t>$(…)* </a:t>
+            </a:r>
+            <a:r>
+              <a:rPr lang="zh-CN" altLang="en-US" dirty="0">
+                <a:latin typeface="Consolas" panose="020B0609020204030204" pitchFamily="49" charset="0"/>
+              </a:rPr>
+              <a:t>结构。</a:t>
+            </a:r>
+            <a:endParaRPr lang="en-US" dirty="0">
+              <a:latin typeface="Consolas" panose="020B0609020204030204" pitchFamily="49" charset="0"/>
+            </a:endParaRPr>
+          </a:p>
+        </p:txBody>
+      </p:sp>
+    </p:spTree>
+    <p:extLst>
+      <p:ext uri="{BB962C8B-B14F-4D97-AF65-F5344CB8AC3E}">
+        <p14:creationId xmlns:p14="http://schemas.microsoft.com/office/powerpoint/2010/main" val="847537037"/>
+      </p:ext>
+    </p:extLst>
+  </p:cSld>
+  <p:clrMapOvr>
+    <a:masterClrMapping/>
+  </p:clrMapOvr>
+</p:sld>
+</file>
+
+<file path=ppt/slides/slide16.xml><?xml version="1.0" encoding="utf-8"?>
+<p:sld xmlns:a="http://schemas.openxmlformats.org/drawingml/2006/main" xmlns:r="http://schemas.openxmlformats.org/officeDocument/2006/relationships" xmlns:p="http://schemas.openxmlformats.org/presentationml/2006/main">
+  <p:cSld>
+    <p:spTree>
+      <p:nvGrpSpPr>
+        <p:cNvPr id="1" name=""/>
+        <p:cNvGrpSpPr/>
+        <p:nvPr/>
+      </p:nvGrpSpPr>
+      <p:grpSpPr>
+        <a:xfrm>
+          <a:off x="0" y="0"/>
+          <a:ext cx="0" cy="0"/>
+          <a:chOff x="0" y="0"/>
+          <a:chExt cx="0" cy="0"/>
+        </a:xfrm>
+      </p:grpSpPr>
+      <p:pic>
+        <p:nvPicPr>
+          <p:cNvPr id="6" name="内容占位符 4">
+            <a:extLst>
+              <a:ext uri="{FF2B5EF4-FFF2-40B4-BE49-F238E27FC236}">
+                <a16:creationId xmlns:a16="http://schemas.microsoft.com/office/drawing/2014/main" id="{10362DB1-DCB9-493F-B604-45F5541501B4}"/>
+              </a:ext>
+            </a:extLst>
+          </p:cNvPr>
+          <p:cNvPicPr>
+            <a:picLocks noChangeAspect="1"/>
+          </p:cNvPicPr>
+          <p:nvPr/>
+        </p:nvPicPr>
+        <p:blipFill>
+          <a:blip r:embed="rId2"/>
+          <a:stretch>
+            <a:fillRect/>
+          </a:stretch>
+        </p:blipFill>
+        <p:spPr>
+          <a:xfrm>
+            <a:off x="440735" y="531034"/>
+            <a:ext cx="3886200" cy="369754"/>
+          </a:xfrm>
+          <a:prstGeom prst="rect">
+            <a:avLst/>
+          </a:prstGeom>
+        </p:spPr>
+      </p:pic>
+      <p:pic>
+        <p:nvPicPr>
+          <p:cNvPr id="5" name="内容占位符 4">
+            <a:extLst>
+              <a:ext uri="{FF2B5EF4-FFF2-40B4-BE49-F238E27FC236}">
+                <a16:creationId xmlns:a16="http://schemas.microsoft.com/office/drawing/2014/main" id="{AE712FF8-5E46-4AB5-8AA5-2224F274F05B}"/>
+              </a:ext>
+            </a:extLst>
+          </p:cNvPr>
+          <p:cNvPicPr>
+            <a:picLocks noChangeAspect="1"/>
+          </p:cNvPicPr>
+          <p:nvPr/>
+        </p:nvPicPr>
+        <p:blipFill rotWithShape="1">
+          <a:blip r:embed="rId3"/>
+          <a:srcRect l="11322" t="12388" r="68175" b="80407"/>
+          <a:stretch/>
+        </p:blipFill>
+        <p:spPr>
+          <a:xfrm>
+            <a:off x="1181100" y="1473200"/>
+            <a:ext cx="1543050" cy="273050"/>
+          </a:xfrm>
+          <a:prstGeom prst="rect">
+            <a:avLst/>
+          </a:prstGeom>
+          <a:ln w="19050">
+            <a:solidFill>
+              <a:srgbClr val="FF6600"/>
+            </a:solidFill>
+          </a:ln>
+        </p:spPr>
+      </p:pic>
+      <p:sp>
+        <p:nvSpPr>
+          <p:cNvPr id="8" name="矩形 7">
+            <a:extLst>
+              <a:ext uri="{FF2B5EF4-FFF2-40B4-BE49-F238E27FC236}">
+                <a16:creationId xmlns:a16="http://schemas.microsoft.com/office/drawing/2014/main" id="{19B703D0-0C3B-479F-9F54-136C875010D5}"/>
+              </a:ext>
+            </a:extLst>
+          </p:cNvPr>
+          <p:cNvSpPr/>
+          <p:nvPr/>
+        </p:nvSpPr>
+        <p:spPr>
+          <a:xfrm>
+            <a:off x="2565400" y="527050"/>
+            <a:ext cx="1606550" cy="374650"/>
+          </a:xfrm>
+          <a:prstGeom prst="rect">
+            <a:avLst/>
+          </a:prstGeom>
+          <a:solidFill>
+            <a:srgbClr val="FF6600">
+              <a:alpha val="18824"/>
+            </a:srgbClr>
+          </a:solidFill>
+          <a:ln w="19050" cap="flat" cmpd="sng" algn="ctr">
+            <a:solidFill>
+              <a:srgbClr val="FF0000"/>
+            </a:solidFill>
+            <a:prstDash val="solid"/>
+            <a:round/>
+            <a:headEnd type="none" w="med" len="med"/>
+            <a:tailEnd type="none" w="med" len="med"/>
+          </a:ln>
+        </p:spPr>
+        <p:style>
+          <a:lnRef idx="0">
+            <a:scrgbClr r="0" g="0" b="0"/>
+          </a:lnRef>
+          <a:fillRef idx="0">
+            <a:scrgbClr r="0" g="0" b="0"/>
+          </a:fillRef>
+          <a:effectRef idx="0">
+            <a:scrgbClr r="0" g="0" b="0"/>
+          </a:effectRef>
+          <a:fontRef idx="minor">
+            <a:schemeClr val="accent2"/>
+          </a:fontRef>
+        </p:style>
+        <p:txBody>
+          <a:bodyPr rot="0" spcFirstLastPara="0" vertOverflow="overflow" horzOverflow="overflow" vert="horz" wrap="square" lIns="91440" tIns="45720" rIns="91440" bIns="45720" numCol="1" spcCol="0" rtlCol="0" fromWordArt="0" anchor="ctr" anchorCtr="0" forceAA="0" compatLnSpc="1">
+            <a:prstTxWarp prst="textNoShape">
+              <a:avLst/>
+            </a:prstTxWarp>
+            <a:noAutofit/>
+          </a:bodyPr>
+          <a:lstStyle/>
+          <a:p>
+            <a:pPr algn="ctr"/>
+            <a:endParaRPr lang="en-US"/>
+          </a:p>
+        </p:txBody>
+      </p:sp>
+      <p:cxnSp>
+        <p:nvCxnSpPr>
+          <p:cNvPr id="4" name="直接箭头连接符 3">
+            <a:extLst>
+              <a:ext uri="{FF2B5EF4-FFF2-40B4-BE49-F238E27FC236}">
+                <a16:creationId xmlns:a16="http://schemas.microsoft.com/office/drawing/2014/main" id="{1BFCA943-4CF8-4C50-8004-E347E732415A}"/>
+              </a:ext>
+            </a:extLst>
+          </p:cNvPr>
+          <p:cNvCxnSpPr>
+            <a:stCxn id="8" idx="2"/>
+          </p:cNvCxnSpPr>
+          <p:nvPr/>
+        </p:nvCxnSpPr>
+        <p:spPr>
+          <a:xfrm flipH="1">
+            <a:off x="3365500" y="901700"/>
+            <a:ext cx="3175" cy="1390650"/>
+          </a:xfrm>
+          <a:prstGeom prst="straightConnector1">
+            <a:avLst/>
+          </a:prstGeom>
+          <a:ln w="19050">
+            <a:solidFill>
+              <a:srgbClr val="FF0000"/>
+            </a:solidFill>
+            <a:tailEnd type="triangle"/>
+          </a:ln>
+        </p:spPr>
+        <p:style>
+          <a:lnRef idx="1">
+            <a:schemeClr val="accent1"/>
+          </a:lnRef>
+          <a:fillRef idx="0">
+            <a:schemeClr val="accent1"/>
+          </a:fillRef>
+          <a:effectRef idx="0">
+            <a:schemeClr val="accent1"/>
+          </a:effectRef>
+          <a:fontRef idx="minor">
+            <a:schemeClr val="tx1"/>
+          </a:fontRef>
+        </p:style>
+      </p:cxnSp>
+      <p:cxnSp>
+        <p:nvCxnSpPr>
+          <p:cNvPr id="9" name="直接连接符 8">
+            <a:extLst>
+              <a:ext uri="{FF2B5EF4-FFF2-40B4-BE49-F238E27FC236}">
+                <a16:creationId xmlns:a16="http://schemas.microsoft.com/office/drawing/2014/main" id="{554FF96D-1686-48BC-8351-040D8EA6A3EB}"/>
+              </a:ext>
+            </a:extLst>
+          </p:cNvPr>
+          <p:cNvCxnSpPr>
+            <a:stCxn id="5" idx="3"/>
+          </p:cNvCxnSpPr>
+          <p:nvPr/>
+        </p:nvCxnSpPr>
+        <p:spPr>
+          <a:xfrm>
+            <a:off x="2724150" y="1609725"/>
+            <a:ext cx="654050" cy="15875"/>
+          </a:xfrm>
+          <a:prstGeom prst="line">
+            <a:avLst/>
+          </a:prstGeom>
+          <a:ln w="19050">
+            <a:solidFill>
+              <a:srgbClr val="FF0000"/>
+            </a:solidFill>
+          </a:ln>
+        </p:spPr>
+        <p:style>
+          <a:lnRef idx="1">
+            <a:schemeClr val="accent1"/>
+          </a:lnRef>
+          <a:fillRef idx="0">
+            <a:schemeClr val="accent1"/>
+          </a:fillRef>
+          <a:effectRef idx="0">
+            <a:schemeClr val="accent1"/>
+          </a:effectRef>
+          <a:fontRef idx="minor">
+            <a:schemeClr val="tx1"/>
+          </a:fontRef>
+        </p:style>
+      </p:cxnSp>
+      <p:sp>
+        <p:nvSpPr>
+          <p:cNvPr id="10" name="文本框 9">
+            <a:extLst>
+              <a:ext uri="{FF2B5EF4-FFF2-40B4-BE49-F238E27FC236}">
+                <a16:creationId xmlns:a16="http://schemas.microsoft.com/office/drawing/2014/main" id="{77855503-A3A0-4904-909D-E4BF45F33EAA}"/>
+              </a:ext>
+            </a:extLst>
+          </p:cNvPr>
+          <p:cNvSpPr txBox="1"/>
+          <p:nvPr/>
+        </p:nvSpPr>
+        <p:spPr>
+          <a:xfrm>
+            <a:off x="2667000" y="1289050"/>
+            <a:ext cx="946150" cy="369332"/>
+          </a:xfrm>
+          <a:prstGeom prst="rect">
+            <a:avLst/>
+          </a:prstGeom>
+          <a:noFill/>
+        </p:spPr>
+        <p:txBody>
+          <a:bodyPr wrap="square" rtlCol="0">
+            <a:spAutoFit/>
+          </a:bodyPr>
+          <a:lstStyle/>
+          <a:p>
+            <a:r>
+              <a:rPr lang="en-US" altLang="zh-CN" dirty="0"/>
+              <a:t>match</a:t>
+            </a:r>
+            <a:endParaRPr lang="en-US" dirty="0"/>
+          </a:p>
+        </p:txBody>
+      </p:sp>
+      <p:sp>
+        <p:nvSpPr>
+          <p:cNvPr id="11" name="文本框 10">
+            <a:extLst>
+              <a:ext uri="{FF2B5EF4-FFF2-40B4-BE49-F238E27FC236}">
+                <a16:creationId xmlns:a16="http://schemas.microsoft.com/office/drawing/2014/main" id="{E36F8B2B-C699-4228-8E6C-A3E77B3C5927}"/>
+              </a:ext>
+            </a:extLst>
+          </p:cNvPr>
+          <p:cNvSpPr txBox="1"/>
+          <p:nvPr/>
+        </p:nvSpPr>
+        <p:spPr>
+          <a:xfrm>
+            <a:off x="1974850" y="2298700"/>
+            <a:ext cx="2774950" cy="369332"/>
+          </a:xfrm>
+          <a:prstGeom prst="rect">
+            <a:avLst/>
+          </a:prstGeom>
+          <a:noFill/>
+          <a:ln w="19050">
+            <a:solidFill>
+              <a:srgbClr val="FF6600"/>
+            </a:solidFill>
+          </a:ln>
+        </p:spPr>
+        <p:txBody>
+          <a:bodyPr wrap="square" rtlCol="0">
+            <a:spAutoFit/>
+          </a:bodyPr>
+          <a:lstStyle/>
+          <a:p>
+            <a:r>
+              <a:rPr lang="en-US" dirty="0"/>
+              <a:t>(expr: 1), (expr: 2), (expr: 3)</a:t>
+            </a:r>
+          </a:p>
+        </p:txBody>
+      </p:sp>
+      <p:pic>
+        <p:nvPicPr>
+          <p:cNvPr id="12" name="内容占位符 4">
+            <a:extLst>
+              <a:ext uri="{FF2B5EF4-FFF2-40B4-BE49-F238E27FC236}">
+                <a16:creationId xmlns:a16="http://schemas.microsoft.com/office/drawing/2014/main" id="{9C2C34BA-7C9B-4E77-A6FF-E7BF00D8C57F}"/>
+              </a:ext>
+            </a:extLst>
+          </p:cNvPr>
+          <p:cNvPicPr>
+            <a:picLocks noChangeAspect="1"/>
+          </p:cNvPicPr>
+          <p:nvPr/>
+        </p:nvPicPr>
+        <p:blipFill rotWithShape="1">
+          <a:blip r:embed="rId3"/>
+          <a:srcRect l="13414" t="19452" r="37903" b="26258"/>
+          <a:stretch/>
+        </p:blipFill>
+        <p:spPr>
+          <a:xfrm>
+            <a:off x="4991099" y="2641600"/>
+            <a:ext cx="3663951" cy="2057400"/>
+          </a:xfrm>
+          <a:prstGeom prst="rect">
+            <a:avLst/>
+          </a:prstGeom>
+          <a:ln w="19050">
+            <a:solidFill>
+              <a:srgbClr val="FF6600"/>
+            </a:solidFill>
+          </a:ln>
+        </p:spPr>
+      </p:pic>
+      <p:cxnSp>
+        <p:nvCxnSpPr>
+          <p:cNvPr id="14" name="直接箭头连接符 13">
+            <a:extLst>
+              <a:ext uri="{FF2B5EF4-FFF2-40B4-BE49-F238E27FC236}">
+                <a16:creationId xmlns:a16="http://schemas.microsoft.com/office/drawing/2014/main" id="{C97544CE-30A6-45C5-AEC8-0F51D11481BF}"/>
+              </a:ext>
+            </a:extLst>
+          </p:cNvPr>
+          <p:cNvCxnSpPr>
+            <a:cxnSpLocks/>
+            <a:stCxn id="11" idx="2"/>
+          </p:cNvCxnSpPr>
+          <p:nvPr/>
+        </p:nvCxnSpPr>
+        <p:spPr>
+          <a:xfrm>
+            <a:off x="3362325" y="2668032"/>
+            <a:ext cx="0" cy="2196068"/>
+          </a:xfrm>
+          <a:prstGeom prst="straightConnector1">
+            <a:avLst/>
+          </a:prstGeom>
+          <a:ln w="19050">
+            <a:solidFill>
+              <a:srgbClr val="FF0000"/>
+            </a:solidFill>
+            <a:tailEnd type="triangle"/>
+          </a:ln>
+        </p:spPr>
+        <p:style>
+          <a:lnRef idx="1">
+            <a:schemeClr val="accent1"/>
+          </a:lnRef>
+          <a:fillRef idx="0">
+            <a:schemeClr val="accent1"/>
+          </a:fillRef>
+          <a:effectRef idx="0">
+            <a:schemeClr val="accent1"/>
+          </a:effectRef>
+          <a:fontRef idx="minor">
+            <a:schemeClr val="tx1"/>
+          </a:fontRef>
+        </p:style>
+      </p:cxnSp>
+      <p:cxnSp>
+        <p:nvCxnSpPr>
+          <p:cNvPr id="18" name="直接连接符 17">
+            <a:extLst>
+              <a:ext uri="{FF2B5EF4-FFF2-40B4-BE49-F238E27FC236}">
+                <a16:creationId xmlns:a16="http://schemas.microsoft.com/office/drawing/2014/main" id="{02998BB9-BA78-4C91-B676-0C60E7452801}"/>
+              </a:ext>
+            </a:extLst>
+          </p:cNvPr>
+          <p:cNvCxnSpPr>
+            <a:stCxn id="12" idx="1"/>
+          </p:cNvCxnSpPr>
+          <p:nvPr/>
+        </p:nvCxnSpPr>
+        <p:spPr>
+          <a:xfrm flipH="1">
+            <a:off x="3371850" y="3670300"/>
+            <a:ext cx="1619249" cy="25400"/>
+          </a:xfrm>
+          <a:prstGeom prst="line">
+            <a:avLst/>
+          </a:prstGeom>
+          <a:ln w="19050">
+            <a:solidFill>
+              <a:srgbClr val="FF0000"/>
+            </a:solidFill>
+          </a:ln>
+        </p:spPr>
+        <p:style>
+          <a:lnRef idx="1">
+            <a:schemeClr val="accent1"/>
+          </a:lnRef>
+          <a:fillRef idx="0">
+            <a:schemeClr val="accent1"/>
+          </a:fillRef>
+          <a:effectRef idx="0">
+            <a:schemeClr val="accent1"/>
+          </a:effectRef>
+          <a:fontRef idx="minor">
+            <a:schemeClr val="tx1"/>
+          </a:fontRef>
+        </p:style>
+      </p:cxnSp>
+      <p:sp>
+        <p:nvSpPr>
+          <p:cNvPr id="19" name="文本框 18">
+            <a:extLst>
+              <a:ext uri="{FF2B5EF4-FFF2-40B4-BE49-F238E27FC236}">
+                <a16:creationId xmlns:a16="http://schemas.microsoft.com/office/drawing/2014/main" id="{32F27D4A-ABAE-46AA-882D-467E0A727515}"/>
+              </a:ext>
+            </a:extLst>
+          </p:cNvPr>
+          <p:cNvSpPr txBox="1"/>
+          <p:nvPr/>
+        </p:nvSpPr>
+        <p:spPr>
+          <a:xfrm>
+            <a:off x="3683000" y="3263900"/>
+            <a:ext cx="946150" cy="646331"/>
+          </a:xfrm>
+          <a:prstGeom prst="rect">
+            <a:avLst/>
+          </a:prstGeom>
+          <a:noFill/>
+        </p:spPr>
+        <p:txBody>
+          <a:bodyPr wrap="square" rtlCol="0">
+            <a:spAutoFit/>
+          </a:bodyPr>
+          <a:lstStyle/>
+          <a:p>
+            <a:r>
+              <a:rPr lang="en-US" dirty="0"/>
+              <a:t>expand</a:t>
+            </a:r>
+          </a:p>
+          <a:p>
+            <a:endParaRPr lang="en-US" dirty="0"/>
+          </a:p>
+        </p:txBody>
+      </p:sp>
+      <p:sp>
+        <p:nvSpPr>
+          <p:cNvPr id="20" name="文本框 19">
+            <a:extLst>
+              <a:ext uri="{FF2B5EF4-FFF2-40B4-BE49-F238E27FC236}">
+                <a16:creationId xmlns:a16="http://schemas.microsoft.com/office/drawing/2014/main" id="{8BD881D5-6DBB-4B3B-8E99-CF4193E6CAC1}"/>
+              </a:ext>
+            </a:extLst>
+          </p:cNvPr>
+          <p:cNvSpPr txBox="1"/>
+          <p:nvPr/>
+        </p:nvSpPr>
+        <p:spPr>
+          <a:xfrm>
+            <a:off x="1809750" y="4876800"/>
+            <a:ext cx="3117850" cy="1477328"/>
+          </a:xfrm>
+          <a:prstGeom prst="rect">
+            <a:avLst/>
+          </a:prstGeom>
+          <a:noFill/>
+          <a:ln w="19050">
+            <a:solidFill>
+              <a:srgbClr val="FF6600"/>
+            </a:solidFill>
+          </a:ln>
+        </p:spPr>
+        <p:txBody>
+          <a:bodyPr wrap="square" rtlCol="0">
+            <a:spAutoFit/>
+          </a:bodyPr>
+          <a:lstStyle/>
+          <a:p>
+            <a:r>
+              <a:rPr lang="en-US" altLang="zh-CN" dirty="0"/>
+              <a:t>let </a:t>
+            </a:r>
+            <a:r>
+              <a:rPr lang="en-US" altLang="zh-CN" dirty="0" err="1"/>
+              <a:t>mut</a:t>
+            </a:r>
+            <a:r>
+              <a:rPr lang="en-US" altLang="zh-CN" dirty="0"/>
+              <a:t> </a:t>
+            </a:r>
+            <a:r>
+              <a:rPr lang="en-US" altLang="zh-CN" dirty="0" err="1"/>
+              <a:t>temp_vec</a:t>
+            </a:r>
+            <a:r>
+              <a:rPr lang="en-US" altLang="zh-CN" dirty="0"/>
+              <a:t> = </a:t>
+            </a:r>
+            <a:r>
+              <a:rPr lang="en-US" altLang="zh-CN" dirty="0" err="1"/>
+              <a:t>Vec</a:t>
+            </a:r>
+            <a:r>
+              <a:rPr lang="en-US" altLang="zh-CN" dirty="0"/>
+              <a:t>::new();</a:t>
+            </a:r>
+          </a:p>
+          <a:p>
+            <a:r>
+              <a:rPr lang="en-US" dirty="0" err="1"/>
+              <a:t>temp_vec.push</a:t>
+            </a:r>
+            <a:r>
+              <a:rPr lang="en-US" dirty="0"/>
+              <a:t>(1);</a:t>
+            </a:r>
+          </a:p>
+          <a:p>
+            <a:r>
+              <a:rPr lang="en-US" dirty="0" err="1"/>
+              <a:t>temp_vec.push</a:t>
+            </a:r>
+            <a:r>
+              <a:rPr lang="en-US" dirty="0"/>
+              <a:t>(2);</a:t>
+            </a:r>
+          </a:p>
+          <a:p>
+            <a:r>
+              <a:rPr lang="en-US" dirty="0" err="1"/>
+              <a:t>temp_vec.push</a:t>
+            </a:r>
+            <a:r>
+              <a:rPr lang="en-US" dirty="0"/>
+              <a:t>(3);</a:t>
+            </a:r>
+          </a:p>
+          <a:p>
+            <a:r>
+              <a:rPr lang="en-US" dirty="0" err="1"/>
+              <a:t>temp_vec</a:t>
+            </a:r>
+            <a:endParaRPr lang="en-US" dirty="0"/>
+          </a:p>
+        </p:txBody>
+      </p:sp>
+    </p:spTree>
+    <p:extLst>
+      <p:ext uri="{BB962C8B-B14F-4D97-AF65-F5344CB8AC3E}">
+        <p14:creationId xmlns:p14="http://schemas.microsoft.com/office/powerpoint/2010/main" val="816113743"/>
+      </p:ext>
+    </p:extLst>
+  </p:cSld>
+  <p:clrMapOvr>
+    <a:masterClrMapping/>
+  </p:clrMapOvr>
+</p:sld>
+</file>
+
+<file path=ppt/slides/slide17.xml><?xml version="1.0" encoding="utf-8"?>
+<p:sld xmlns:a="http://schemas.openxmlformats.org/drawingml/2006/main" xmlns:r="http://schemas.openxmlformats.org/officeDocument/2006/relationships" xmlns:p="http://schemas.openxmlformats.org/presentationml/2006/main">
+  <p:cSld>
+    <p:spTree>
+      <p:nvGrpSpPr>
+        <p:cNvPr id="1" name=""/>
+        <p:cNvGrpSpPr/>
+        <p:nvPr/>
+      </p:nvGrpSpPr>
+      <p:grpSpPr>
+        <a:xfrm>
+          <a:off x="0" y="0"/>
+          <a:ext cx="0" cy="0"/>
+          <a:chOff x="0" y="0"/>
+          <a:chExt cx="0" cy="0"/>
+        </a:xfrm>
+      </p:grpSpPr>
+      <p:sp>
+        <p:nvSpPr>
+          <p:cNvPr id="2" name="标题 1">
+            <a:extLst>
+              <a:ext uri="{FF2B5EF4-FFF2-40B4-BE49-F238E27FC236}">
+                <a16:creationId xmlns:a16="http://schemas.microsoft.com/office/drawing/2014/main" id="{7FA1BFA8-B2F7-4150-8A23-0CDDD62FA6C6}"/>
+              </a:ext>
+            </a:extLst>
+          </p:cNvPr>
+          <p:cNvSpPr>
+            <a:spLocks noGrp="1"/>
+          </p:cNvSpPr>
+          <p:nvPr>
+            <p:ph type="title"/>
+          </p:nvPr>
+        </p:nvSpPr>
+        <p:spPr/>
+        <p:txBody>
+          <a:bodyPr/>
+          <a:lstStyle/>
+          <a:p>
+            <a:r>
+              <a:rPr lang="zh-CN" altLang="en-US" dirty="0"/>
+              <a:t>另一个宏展开的例子</a:t>
+            </a:r>
+            <a:endParaRPr lang="en-US" dirty="0"/>
+          </a:p>
+        </p:txBody>
+      </p:sp>
+      <p:pic>
+        <p:nvPicPr>
+          <p:cNvPr id="6" name="内容占位符 5">
+            <a:extLst>
+              <a:ext uri="{FF2B5EF4-FFF2-40B4-BE49-F238E27FC236}">
+                <a16:creationId xmlns:a16="http://schemas.microsoft.com/office/drawing/2014/main" id="{12490870-15A7-42F4-BB1D-80F50C01CB6C}"/>
+              </a:ext>
+            </a:extLst>
+          </p:cNvPr>
+          <p:cNvPicPr>
+            <a:picLocks noGrp="1" noChangeAspect="1"/>
+          </p:cNvPicPr>
+          <p:nvPr>
+            <p:ph sz="half" idx="1"/>
+          </p:nvPr>
+        </p:nvPicPr>
+        <p:blipFill>
+          <a:blip r:embed="rId2"/>
+          <a:stretch>
+            <a:fillRect/>
+          </a:stretch>
+        </p:blipFill>
+        <p:spPr>
+          <a:xfrm>
+            <a:off x="628650" y="1762807"/>
+            <a:ext cx="7918450" cy="4001448"/>
+          </a:xfrm>
+          <a:prstGeom prst="rect">
+            <a:avLst/>
+          </a:prstGeom>
+        </p:spPr>
+      </p:pic>
+      <p:sp>
+        <p:nvSpPr>
+          <p:cNvPr id="4" name="内容占位符 3">
+            <a:extLst>
+              <a:ext uri="{FF2B5EF4-FFF2-40B4-BE49-F238E27FC236}">
+                <a16:creationId xmlns:a16="http://schemas.microsoft.com/office/drawing/2014/main" id="{9A6CD0C5-8B28-4460-B682-90D3E410CCB9}"/>
+              </a:ext>
+            </a:extLst>
+          </p:cNvPr>
+          <p:cNvSpPr>
+            <a:spLocks noGrp="1"/>
+          </p:cNvSpPr>
+          <p:nvPr>
+            <p:ph sz="half" idx="2"/>
+          </p:nvPr>
+        </p:nvSpPr>
+        <p:spPr/>
+        <p:txBody>
+          <a:bodyPr/>
+          <a:lstStyle/>
+          <a:p>
+            <a:endParaRPr lang="en-US" dirty="0"/>
+          </a:p>
+        </p:txBody>
+      </p:sp>
+    </p:spTree>
+    <p:extLst>
+      <p:ext uri="{BB962C8B-B14F-4D97-AF65-F5344CB8AC3E}">
+        <p14:creationId xmlns:p14="http://schemas.microsoft.com/office/powerpoint/2010/main" val="4098310254"/>
       </p:ext>
     </p:extLst>
   </p:cSld>

</xml_diff>

<commit_message>
Sync 18-01-13 04:35:05 UTC+0 @SP3
</commit_message>
<xml_diff>
--- a/Slides/Rust Part Slides.pptx
+++ b/Slides/Rust Part Slides.pptx
@@ -31825,6 +31825,13 @@
               <a:rPr lang="zh-CN" altLang="en-US" dirty="0"/>
               <a:t>每一次宏展开都拥有单独的上下文</a:t>
             </a:r>
+            <a:endParaRPr lang="en-US" altLang="zh-CN" dirty="0"/>
+          </a:p>
+          <a:p>
+            <a:r>
+              <a:rPr lang="zh-CN" altLang="en-US"/>
+              <a:t>避免符号冲突</a:t>
+            </a:r>
             <a:endParaRPr lang="en-US" dirty="0"/>
           </a:p>
           <a:p>

</xml_diff>